<commit_message>
add data csv and update alanyze lda
</commit_message>
<xml_diff>
--- a/Topic Modeling NIPS paper.pptx
+++ b/Topic Modeling NIPS paper.pptx
@@ -22,6 +22,7 @@
     <p:sldId id="270" r:id="rId16"/>
     <p:sldId id="271" r:id="rId17"/>
     <p:sldId id="272" r:id="rId18"/>
+    <p:sldId id="273" r:id="rId19"/>
   </p:sldIdLst>
   <p:sldSz cx="12192000" cy="6858000"/>
   <p:notesSz cx="6858000" cy="9144000"/>
@@ -8363,6 +8364,139 @@
 </p:sld>
 </file>
 
+<file path=ppt/slides/slide18.xml><?xml version="1.0" encoding="utf-8"?>
+<p:sld xmlns:a="http://schemas.openxmlformats.org/drawingml/2006/main" xmlns:r="http://schemas.openxmlformats.org/officeDocument/2006/relationships" xmlns:p="http://schemas.openxmlformats.org/presentationml/2006/main">
+  <p:cSld>
+    <p:spTree>
+      <p:nvGrpSpPr>
+        <p:cNvPr id="1" name=""/>
+        <p:cNvGrpSpPr/>
+        <p:nvPr/>
+      </p:nvGrpSpPr>
+      <p:grpSpPr>
+        <a:xfrm>
+          <a:off x="0" y="0"/>
+          <a:ext cx="0" cy="0"/>
+          <a:chOff x="0" y="0"/>
+          <a:chExt cx="0" cy="0"/>
+        </a:xfrm>
+      </p:grpSpPr>
+      <p:sp>
+        <p:nvSpPr>
+          <p:cNvPr id="2" name="Title 1">
+            <a:extLst>
+              <a:ext uri="{FF2B5EF4-FFF2-40B4-BE49-F238E27FC236}">
+                <a16:creationId xmlns:a16="http://schemas.microsoft.com/office/drawing/2014/main" id="{C02B566F-CA1F-4C30-A53F-4B6AA540FCC4}"/>
+              </a:ext>
+            </a:extLst>
+          </p:cNvPr>
+          <p:cNvSpPr>
+            <a:spLocks noGrp="1"/>
+          </p:cNvSpPr>
+          <p:nvPr>
+            <p:ph type="title"/>
+          </p:nvPr>
+        </p:nvSpPr>
+        <p:spPr/>
+        <p:txBody>
+          <a:bodyPr/>
+          <a:lstStyle/>
+          <a:p>
+            <a:r>
+              <a:rPr lang="en-US" dirty="0"/>
+              <a:t>Topic Coherence</a:t>
+            </a:r>
+          </a:p>
+        </p:txBody>
+      </p:sp>
+      <p:sp>
+        <p:nvSpPr>
+          <p:cNvPr id="3" name="Content Placeholder 2">
+            <a:extLst>
+              <a:ext uri="{FF2B5EF4-FFF2-40B4-BE49-F238E27FC236}">
+                <a16:creationId xmlns:a16="http://schemas.microsoft.com/office/drawing/2014/main" id="{E1F3E730-D3DB-40E2-8090-4310490F0484}"/>
+              </a:ext>
+            </a:extLst>
+          </p:cNvPr>
+          <p:cNvSpPr>
+            <a:spLocks noGrp="1"/>
+          </p:cNvSpPr>
+          <p:nvPr>
+            <p:ph idx="1"/>
+          </p:nvPr>
+        </p:nvSpPr>
+        <p:spPr/>
+        <p:txBody>
+          <a:bodyPr>
+            <a:normAutofit fontScale="92500" lnSpcReduction="10000"/>
+          </a:bodyPr>
+          <a:lstStyle/>
+          <a:p>
+            <a:r>
+              <a:rPr lang="en-US" dirty="0"/>
+              <a:t>Topic Coherence is a measure used to evaluate topic models</a:t>
+            </a:r>
+          </a:p>
+          <a:p>
+            <a:r>
+              <a:rPr lang="en-US" dirty="0"/>
+              <a:t>topic coherence is applied to the top N words from the topic. It is defined as the average / median of the pairwise word-similarity scores of the words in the topic </a:t>
+            </a:r>
+          </a:p>
+          <a:p>
+            <a:r>
+              <a:rPr lang="en-US" dirty="0"/>
+              <a:t>A good model will generate coherent topics, i.e., topics with high topic coherence scores. Good topics are topics that can be described by a short label, therefore this is what the topic coherence measure should capture.</a:t>
+            </a:r>
+          </a:p>
+          <a:p>
+            <a:pPr marL="0" indent="0">
+              <a:buNone/>
+            </a:pPr>
+            <a:endParaRPr lang="en-US" dirty="0"/>
+          </a:p>
+          <a:p>
+            <a:pPr marL="0" indent="0">
+              <a:buNone/>
+            </a:pPr>
+            <a:r>
+              <a:rPr lang="en-US" dirty="0"/>
+              <a:t>Topics coherence LSA values = -1.936255302421058</a:t>
+            </a:r>
+          </a:p>
+          <a:p>
+            <a:pPr marL="0" indent="0">
+              <a:buNone/>
+            </a:pPr>
+            <a:r>
+              <a:rPr lang="en-US" dirty="0"/>
+              <a:t>Topics coherence NMF values = -0.8832852958216879</a:t>
+            </a:r>
+          </a:p>
+          <a:p>
+            <a:pPr marL="0" indent="0">
+              <a:buNone/>
+            </a:pPr>
+            <a:r>
+              <a:rPr lang="en-US" dirty="0"/>
+              <a:t>Topics coherence LDA values = -0.7863112062812903</a:t>
+            </a:r>
+          </a:p>
+        </p:txBody>
+      </p:sp>
+    </p:spTree>
+    <p:extLst>
+      <p:ext uri="{BB962C8B-B14F-4D97-AF65-F5344CB8AC3E}">
+        <p14:creationId xmlns:p14="http://schemas.microsoft.com/office/powerpoint/2010/main" val="1636018862"/>
+      </p:ext>
+    </p:extLst>
+  </p:cSld>
+  <p:clrMapOvr>
+    <a:masterClrMapping/>
+  </p:clrMapOvr>
+</p:sld>
+</file>
+
 <file path=ppt/slides/slide2.xml><?xml version="1.0" encoding="utf-8"?>
 <p:sld xmlns:a="http://schemas.openxmlformats.org/drawingml/2006/main" xmlns:r="http://schemas.openxmlformats.org/officeDocument/2006/relationships" xmlns:p="http://schemas.openxmlformats.org/presentationml/2006/main">
   <p:cSld>

</xml_diff>